<commit_message>
Add more materials to resources and PPTX
</commit_message>
<xml_diff>
--- a/warner-azure-aws.pptx
+++ b/warner-azure-aws.pptx
@@ -8,7 +8,7 @@
     <p:sldMasterId id="2147483673" r:id="rId4"/>
   </p:sldMasterIdLst>
   <p:notesMasterIdLst>
-    <p:notesMasterId r:id="rId18"/>
+    <p:notesMasterId r:id="rId30"/>
   </p:notesMasterIdLst>
   <p:sldIdLst>
     <p:sldId id="2076137171" r:id="rId5"/>
@@ -24,6 +24,18 @@
     <p:sldId id="303" r:id="rId15"/>
     <p:sldId id="2076137137" r:id="rId16"/>
     <p:sldId id="2076137152" r:id="rId17"/>
+    <p:sldId id="2076137172" r:id="rId18"/>
+    <p:sldId id="2076137173" r:id="rId19"/>
+    <p:sldId id="2076137174" r:id="rId20"/>
+    <p:sldId id="2076137175" r:id="rId21"/>
+    <p:sldId id="2076137176" r:id="rId22"/>
+    <p:sldId id="2076137177" r:id="rId23"/>
+    <p:sldId id="2076137178" r:id="rId24"/>
+    <p:sldId id="2076137179" r:id="rId25"/>
+    <p:sldId id="2076137180" r:id="rId26"/>
+    <p:sldId id="2076137181" r:id="rId27"/>
+    <p:sldId id="2076137182" r:id="rId28"/>
+    <p:sldId id="2076137183" r:id="rId29"/>
   </p:sldIdLst>
   <p:sldSz cx="9144000" cy="5143500" type="screen16x9"/>
   <p:notesSz cx="6858000" cy="9144000"/>
@@ -140,10 +152,46 @@
             <p14:sldId id="303"/>
           </p14:sldIdLst>
         </p14:section>
-        <p14:section name="CONTENT" id="{82128640-D2B9-4BBD-B7AB-97C1533D000B}">
+        <p14:section name="General Comparison" id="{82128640-D2B9-4BBD-B7AB-97C1533D000B}">
           <p14:sldIdLst>
             <p14:sldId id="2076137137"/>
             <p14:sldId id="2076137152"/>
+          </p14:sldIdLst>
+        </p14:section>
+        <p14:section name="Storage" id="{242BF8F7-D59D-4BD2-8C47-C9D85044E6DF}">
+          <p14:sldIdLst>
+            <p14:sldId id="2076137172"/>
+            <p14:sldId id="2076137173"/>
+          </p14:sldIdLst>
+        </p14:section>
+        <p14:section name="Compute" id="{C10E0B3E-CB2E-49E6-9D51-553E7B8EA62F}">
+          <p14:sldIdLst>
+            <p14:sldId id="2076137174"/>
+            <p14:sldId id="2076137175"/>
+          </p14:sldIdLst>
+        </p14:section>
+        <p14:section name="Networking" id="{10DDDB3F-D2F9-4EFE-A1EB-F9E752B37318}">
+          <p14:sldIdLst>
+            <p14:sldId id="2076137176"/>
+            <p14:sldId id="2076137177"/>
+          </p14:sldIdLst>
+        </p14:section>
+        <p14:section name="Security" id="{E7BB8489-6620-4DA5-83F9-DFF910F3F9C4}">
+          <p14:sldIdLst>
+            <p14:sldId id="2076137178"/>
+            <p14:sldId id="2076137179"/>
+          </p14:sldIdLst>
+        </p14:section>
+        <p14:section name="Monitoring" id="{DF1E44A6-8FD3-4559-8356-F62D52514978}">
+          <p14:sldIdLst>
+            <p14:sldId id="2076137180"/>
+            <p14:sldId id="2076137181"/>
+          </p14:sldIdLst>
+        </p14:section>
+        <p14:section name="Pricing" id="{FAD7ED0F-09B8-4400-9748-18FF25B038BF}">
+          <p14:sldIdLst>
+            <p14:sldId id="2076137182"/>
+            <p14:sldId id="2076137183"/>
           </p14:sldIdLst>
         </p14:section>
       </p14:sectionLst>
@@ -15485,6 +15533,429 @@
 </p:sld>
 </file>
 
+<file path=ppt/slides/slide14.xml><?xml version="1.0" encoding="utf-8"?>
+<p:sld xmlns:a="http://schemas.openxmlformats.org/drawingml/2006/main" xmlns:r="http://schemas.openxmlformats.org/officeDocument/2006/relationships" xmlns:p="http://schemas.openxmlformats.org/presentationml/2006/main">
+  <p:cSld>
+    <p:spTree>
+      <p:nvGrpSpPr>
+        <p:cNvPr id="1" name=""/>
+        <p:cNvGrpSpPr/>
+        <p:nvPr/>
+      </p:nvGrpSpPr>
+      <p:grpSpPr>
+        <a:xfrm>
+          <a:off x="0" y="0"/>
+          <a:ext cx="0" cy="0"/>
+          <a:chOff x="0" y="0"/>
+          <a:chExt cx="0" cy="0"/>
+        </a:xfrm>
+      </p:grpSpPr>
+      <p:sp>
+        <p:nvSpPr>
+          <p:cNvPr id="6" name="Title 5">
+            <a:extLst>
+              <a:ext uri="{FF2B5EF4-FFF2-40B4-BE49-F238E27FC236}">
+                <a16:creationId xmlns:a16="http://schemas.microsoft.com/office/drawing/2014/main" id="{D9FFC0E8-97CE-4426-A0C0-75252002ED16}"/>
+              </a:ext>
+            </a:extLst>
+          </p:cNvPr>
+          <p:cNvSpPr>
+            <a:spLocks noGrp="1"/>
+          </p:cNvSpPr>
+          <p:nvPr>
+            <p:ph type="ctrTitle"/>
+          </p:nvPr>
+        </p:nvSpPr>
+        <p:spPr/>
+        <p:txBody>
+          <a:bodyPr/>
+          <a:lstStyle/>
+          <a:p>
+            <a:r>
+              <a:rPr lang="en-US" dirty="0"/>
+              <a:t>Title</a:t>
+            </a:r>
+          </a:p>
+        </p:txBody>
+      </p:sp>
+    </p:spTree>
+    <p:extLst>
+      <p:ext uri="{BB962C8B-B14F-4D97-AF65-F5344CB8AC3E}">
+        <p14:creationId xmlns:p14="http://schemas.microsoft.com/office/powerpoint/2010/main" val="612985564"/>
+      </p:ext>
+    </p:extLst>
+  </p:cSld>
+  <p:clrMapOvr>
+    <a:masterClrMapping/>
+  </p:clrMapOvr>
+</p:sld>
+</file>
+
+<file path=ppt/slides/slide15.xml><?xml version="1.0" encoding="utf-8"?>
+<p:sld xmlns:a="http://schemas.openxmlformats.org/drawingml/2006/main" xmlns:r="http://schemas.openxmlformats.org/officeDocument/2006/relationships" xmlns:p="http://schemas.openxmlformats.org/presentationml/2006/main">
+  <p:cSld>
+    <p:spTree>
+      <p:nvGrpSpPr>
+        <p:cNvPr id="1" name=""/>
+        <p:cNvGrpSpPr/>
+        <p:nvPr/>
+      </p:nvGrpSpPr>
+      <p:grpSpPr>
+        <a:xfrm>
+          <a:off x="0" y="0"/>
+          <a:ext cx="0" cy="0"/>
+          <a:chOff x="0" y="0"/>
+          <a:chExt cx="0" cy="0"/>
+        </a:xfrm>
+      </p:grpSpPr>
+      <p:sp>
+        <p:nvSpPr>
+          <p:cNvPr id="2" name="Title 1">
+            <a:extLst>
+              <a:ext uri="{FF2B5EF4-FFF2-40B4-BE49-F238E27FC236}">
+                <a16:creationId xmlns:a16="http://schemas.microsoft.com/office/drawing/2014/main" id="{7B825C97-D6C6-411B-9807-E2D1BEF1312E}"/>
+              </a:ext>
+            </a:extLst>
+          </p:cNvPr>
+          <p:cNvSpPr>
+            <a:spLocks noGrp="1"/>
+          </p:cNvSpPr>
+          <p:nvPr>
+            <p:ph type="title"/>
+          </p:nvPr>
+        </p:nvSpPr>
+        <p:spPr/>
+        <p:txBody>
+          <a:bodyPr/>
+          <a:lstStyle/>
+          <a:p>
+            <a:r>
+              <a:rPr lang="en-US" dirty="0"/>
+              <a:t>Title</a:t>
+            </a:r>
+          </a:p>
+        </p:txBody>
+      </p:sp>
+      <p:sp>
+        <p:nvSpPr>
+          <p:cNvPr id="3" name="Content Placeholder 2">
+            <a:extLst>
+              <a:ext uri="{FF2B5EF4-FFF2-40B4-BE49-F238E27FC236}">
+                <a16:creationId xmlns:a16="http://schemas.microsoft.com/office/drawing/2014/main" id="{735D6932-4AC1-46A9-906A-91A48F4CF7C3}"/>
+              </a:ext>
+            </a:extLst>
+          </p:cNvPr>
+          <p:cNvSpPr>
+            <a:spLocks noGrp="1"/>
+          </p:cNvSpPr>
+          <p:nvPr>
+            <p:ph idx="1"/>
+          </p:nvPr>
+        </p:nvSpPr>
+        <p:spPr/>
+        <p:txBody>
+          <a:bodyPr/>
+          <a:lstStyle/>
+          <a:p>
+            <a:endParaRPr lang="en-US"/>
+          </a:p>
+        </p:txBody>
+      </p:sp>
+    </p:spTree>
+    <p:extLst>
+      <p:ext uri="{BB962C8B-B14F-4D97-AF65-F5344CB8AC3E}">
+        <p14:creationId xmlns:p14="http://schemas.microsoft.com/office/powerpoint/2010/main" val="1315580482"/>
+      </p:ext>
+    </p:extLst>
+  </p:cSld>
+  <p:clrMapOvr>
+    <a:masterClrMapping/>
+  </p:clrMapOvr>
+</p:sld>
+</file>
+
+<file path=ppt/slides/slide16.xml><?xml version="1.0" encoding="utf-8"?>
+<p:sld xmlns:a="http://schemas.openxmlformats.org/drawingml/2006/main" xmlns:r="http://schemas.openxmlformats.org/officeDocument/2006/relationships" xmlns:p="http://schemas.openxmlformats.org/presentationml/2006/main">
+  <p:cSld>
+    <p:spTree>
+      <p:nvGrpSpPr>
+        <p:cNvPr id="1" name=""/>
+        <p:cNvGrpSpPr/>
+        <p:nvPr/>
+      </p:nvGrpSpPr>
+      <p:grpSpPr>
+        <a:xfrm>
+          <a:off x="0" y="0"/>
+          <a:ext cx="0" cy="0"/>
+          <a:chOff x="0" y="0"/>
+          <a:chExt cx="0" cy="0"/>
+        </a:xfrm>
+      </p:grpSpPr>
+      <p:sp>
+        <p:nvSpPr>
+          <p:cNvPr id="6" name="Title 5">
+            <a:extLst>
+              <a:ext uri="{FF2B5EF4-FFF2-40B4-BE49-F238E27FC236}">
+                <a16:creationId xmlns:a16="http://schemas.microsoft.com/office/drawing/2014/main" id="{D9FFC0E8-97CE-4426-A0C0-75252002ED16}"/>
+              </a:ext>
+            </a:extLst>
+          </p:cNvPr>
+          <p:cNvSpPr>
+            <a:spLocks noGrp="1"/>
+          </p:cNvSpPr>
+          <p:nvPr>
+            <p:ph type="ctrTitle"/>
+          </p:nvPr>
+        </p:nvSpPr>
+        <p:spPr/>
+        <p:txBody>
+          <a:bodyPr/>
+          <a:lstStyle/>
+          <a:p>
+            <a:r>
+              <a:rPr lang="en-US" dirty="0"/>
+              <a:t>Title</a:t>
+            </a:r>
+          </a:p>
+        </p:txBody>
+      </p:sp>
+    </p:spTree>
+    <p:extLst>
+      <p:ext uri="{BB962C8B-B14F-4D97-AF65-F5344CB8AC3E}">
+        <p14:creationId xmlns:p14="http://schemas.microsoft.com/office/powerpoint/2010/main" val="580914773"/>
+      </p:ext>
+    </p:extLst>
+  </p:cSld>
+  <p:clrMapOvr>
+    <a:masterClrMapping/>
+  </p:clrMapOvr>
+</p:sld>
+</file>
+
+<file path=ppt/slides/slide17.xml><?xml version="1.0" encoding="utf-8"?>
+<p:sld xmlns:a="http://schemas.openxmlformats.org/drawingml/2006/main" xmlns:r="http://schemas.openxmlformats.org/officeDocument/2006/relationships" xmlns:p="http://schemas.openxmlformats.org/presentationml/2006/main">
+  <p:cSld>
+    <p:spTree>
+      <p:nvGrpSpPr>
+        <p:cNvPr id="1" name=""/>
+        <p:cNvGrpSpPr/>
+        <p:nvPr/>
+      </p:nvGrpSpPr>
+      <p:grpSpPr>
+        <a:xfrm>
+          <a:off x="0" y="0"/>
+          <a:ext cx="0" cy="0"/>
+          <a:chOff x="0" y="0"/>
+          <a:chExt cx="0" cy="0"/>
+        </a:xfrm>
+      </p:grpSpPr>
+      <p:sp>
+        <p:nvSpPr>
+          <p:cNvPr id="2" name="Title 1">
+            <a:extLst>
+              <a:ext uri="{FF2B5EF4-FFF2-40B4-BE49-F238E27FC236}">
+                <a16:creationId xmlns:a16="http://schemas.microsoft.com/office/drawing/2014/main" id="{7B825C97-D6C6-411B-9807-E2D1BEF1312E}"/>
+              </a:ext>
+            </a:extLst>
+          </p:cNvPr>
+          <p:cNvSpPr>
+            <a:spLocks noGrp="1"/>
+          </p:cNvSpPr>
+          <p:nvPr>
+            <p:ph type="title"/>
+          </p:nvPr>
+        </p:nvSpPr>
+        <p:spPr/>
+        <p:txBody>
+          <a:bodyPr/>
+          <a:lstStyle/>
+          <a:p>
+            <a:r>
+              <a:rPr lang="en-US" dirty="0"/>
+              <a:t>Title</a:t>
+            </a:r>
+          </a:p>
+        </p:txBody>
+      </p:sp>
+      <p:sp>
+        <p:nvSpPr>
+          <p:cNvPr id="3" name="Content Placeholder 2">
+            <a:extLst>
+              <a:ext uri="{FF2B5EF4-FFF2-40B4-BE49-F238E27FC236}">
+                <a16:creationId xmlns:a16="http://schemas.microsoft.com/office/drawing/2014/main" id="{735D6932-4AC1-46A9-906A-91A48F4CF7C3}"/>
+              </a:ext>
+            </a:extLst>
+          </p:cNvPr>
+          <p:cNvSpPr>
+            <a:spLocks noGrp="1"/>
+          </p:cNvSpPr>
+          <p:nvPr>
+            <p:ph idx="1"/>
+          </p:nvPr>
+        </p:nvSpPr>
+        <p:spPr/>
+        <p:txBody>
+          <a:bodyPr/>
+          <a:lstStyle/>
+          <a:p>
+            <a:endParaRPr lang="en-US"/>
+          </a:p>
+        </p:txBody>
+      </p:sp>
+    </p:spTree>
+    <p:extLst>
+      <p:ext uri="{BB962C8B-B14F-4D97-AF65-F5344CB8AC3E}">
+        <p14:creationId xmlns:p14="http://schemas.microsoft.com/office/powerpoint/2010/main" val="1296543629"/>
+      </p:ext>
+    </p:extLst>
+  </p:cSld>
+  <p:clrMapOvr>
+    <a:masterClrMapping/>
+  </p:clrMapOvr>
+</p:sld>
+</file>
+
+<file path=ppt/slides/slide18.xml><?xml version="1.0" encoding="utf-8"?>
+<p:sld xmlns:a="http://schemas.openxmlformats.org/drawingml/2006/main" xmlns:r="http://schemas.openxmlformats.org/officeDocument/2006/relationships" xmlns:p="http://schemas.openxmlformats.org/presentationml/2006/main">
+  <p:cSld>
+    <p:spTree>
+      <p:nvGrpSpPr>
+        <p:cNvPr id="1" name=""/>
+        <p:cNvGrpSpPr/>
+        <p:nvPr/>
+      </p:nvGrpSpPr>
+      <p:grpSpPr>
+        <a:xfrm>
+          <a:off x="0" y="0"/>
+          <a:ext cx="0" cy="0"/>
+          <a:chOff x="0" y="0"/>
+          <a:chExt cx="0" cy="0"/>
+        </a:xfrm>
+      </p:grpSpPr>
+      <p:sp>
+        <p:nvSpPr>
+          <p:cNvPr id="6" name="Title 5">
+            <a:extLst>
+              <a:ext uri="{FF2B5EF4-FFF2-40B4-BE49-F238E27FC236}">
+                <a16:creationId xmlns:a16="http://schemas.microsoft.com/office/drawing/2014/main" id="{D9FFC0E8-97CE-4426-A0C0-75252002ED16}"/>
+              </a:ext>
+            </a:extLst>
+          </p:cNvPr>
+          <p:cNvSpPr>
+            <a:spLocks noGrp="1"/>
+          </p:cNvSpPr>
+          <p:nvPr>
+            <p:ph type="ctrTitle"/>
+          </p:nvPr>
+        </p:nvSpPr>
+        <p:spPr/>
+        <p:txBody>
+          <a:bodyPr/>
+          <a:lstStyle/>
+          <a:p>
+            <a:r>
+              <a:rPr lang="en-US" dirty="0"/>
+              <a:t>Title</a:t>
+            </a:r>
+          </a:p>
+        </p:txBody>
+      </p:sp>
+    </p:spTree>
+    <p:extLst>
+      <p:ext uri="{BB962C8B-B14F-4D97-AF65-F5344CB8AC3E}">
+        <p14:creationId xmlns:p14="http://schemas.microsoft.com/office/powerpoint/2010/main" val="1790132994"/>
+      </p:ext>
+    </p:extLst>
+  </p:cSld>
+  <p:clrMapOvr>
+    <a:masterClrMapping/>
+  </p:clrMapOvr>
+</p:sld>
+</file>
+
+<file path=ppt/slides/slide19.xml><?xml version="1.0" encoding="utf-8"?>
+<p:sld xmlns:a="http://schemas.openxmlformats.org/drawingml/2006/main" xmlns:r="http://schemas.openxmlformats.org/officeDocument/2006/relationships" xmlns:p="http://schemas.openxmlformats.org/presentationml/2006/main">
+  <p:cSld>
+    <p:spTree>
+      <p:nvGrpSpPr>
+        <p:cNvPr id="1" name=""/>
+        <p:cNvGrpSpPr/>
+        <p:nvPr/>
+      </p:nvGrpSpPr>
+      <p:grpSpPr>
+        <a:xfrm>
+          <a:off x="0" y="0"/>
+          <a:ext cx="0" cy="0"/>
+          <a:chOff x="0" y="0"/>
+          <a:chExt cx="0" cy="0"/>
+        </a:xfrm>
+      </p:grpSpPr>
+      <p:sp>
+        <p:nvSpPr>
+          <p:cNvPr id="2" name="Title 1">
+            <a:extLst>
+              <a:ext uri="{FF2B5EF4-FFF2-40B4-BE49-F238E27FC236}">
+                <a16:creationId xmlns:a16="http://schemas.microsoft.com/office/drawing/2014/main" id="{7B825C97-D6C6-411B-9807-E2D1BEF1312E}"/>
+              </a:ext>
+            </a:extLst>
+          </p:cNvPr>
+          <p:cNvSpPr>
+            <a:spLocks noGrp="1"/>
+          </p:cNvSpPr>
+          <p:nvPr>
+            <p:ph type="title"/>
+          </p:nvPr>
+        </p:nvSpPr>
+        <p:spPr/>
+        <p:txBody>
+          <a:bodyPr/>
+          <a:lstStyle/>
+          <a:p>
+            <a:r>
+              <a:rPr lang="en-US" dirty="0"/>
+              <a:t>Title</a:t>
+            </a:r>
+          </a:p>
+        </p:txBody>
+      </p:sp>
+      <p:sp>
+        <p:nvSpPr>
+          <p:cNvPr id="3" name="Content Placeholder 2">
+            <a:extLst>
+              <a:ext uri="{FF2B5EF4-FFF2-40B4-BE49-F238E27FC236}">
+                <a16:creationId xmlns:a16="http://schemas.microsoft.com/office/drawing/2014/main" id="{735D6932-4AC1-46A9-906A-91A48F4CF7C3}"/>
+              </a:ext>
+            </a:extLst>
+          </p:cNvPr>
+          <p:cNvSpPr>
+            <a:spLocks noGrp="1"/>
+          </p:cNvSpPr>
+          <p:nvPr>
+            <p:ph idx="1"/>
+          </p:nvPr>
+        </p:nvSpPr>
+        <p:spPr/>
+        <p:txBody>
+          <a:bodyPr/>
+          <a:lstStyle/>
+          <a:p>
+            <a:endParaRPr lang="en-US"/>
+          </a:p>
+        </p:txBody>
+      </p:sp>
+    </p:spTree>
+    <p:extLst>
+      <p:ext uri="{BB962C8B-B14F-4D97-AF65-F5344CB8AC3E}">
+        <p14:creationId xmlns:p14="http://schemas.microsoft.com/office/powerpoint/2010/main" val="731190099"/>
+      </p:ext>
+    </p:extLst>
+  </p:cSld>
+  <p:clrMapOvr>
+    <a:masterClrMapping/>
+  </p:clrMapOvr>
+</p:sld>
+</file>
+
 <file path=ppt/slides/slide2.xml><?xml version="1.0" encoding="utf-8"?>
 <p:sld xmlns:a="http://schemas.openxmlformats.org/drawingml/2006/main" xmlns:r="http://schemas.openxmlformats.org/officeDocument/2006/relationships" xmlns:p="http://schemas.openxmlformats.org/presentationml/2006/main">
   <p:cSld>
@@ -15743,6 +16214,429 @@
 </p:sld>
 </file>
 
+<file path=ppt/slides/slide20.xml><?xml version="1.0" encoding="utf-8"?>
+<p:sld xmlns:a="http://schemas.openxmlformats.org/drawingml/2006/main" xmlns:r="http://schemas.openxmlformats.org/officeDocument/2006/relationships" xmlns:p="http://schemas.openxmlformats.org/presentationml/2006/main">
+  <p:cSld>
+    <p:spTree>
+      <p:nvGrpSpPr>
+        <p:cNvPr id="1" name=""/>
+        <p:cNvGrpSpPr/>
+        <p:nvPr/>
+      </p:nvGrpSpPr>
+      <p:grpSpPr>
+        <a:xfrm>
+          <a:off x="0" y="0"/>
+          <a:ext cx="0" cy="0"/>
+          <a:chOff x="0" y="0"/>
+          <a:chExt cx="0" cy="0"/>
+        </a:xfrm>
+      </p:grpSpPr>
+      <p:sp>
+        <p:nvSpPr>
+          <p:cNvPr id="6" name="Title 5">
+            <a:extLst>
+              <a:ext uri="{FF2B5EF4-FFF2-40B4-BE49-F238E27FC236}">
+                <a16:creationId xmlns:a16="http://schemas.microsoft.com/office/drawing/2014/main" id="{D9FFC0E8-97CE-4426-A0C0-75252002ED16}"/>
+              </a:ext>
+            </a:extLst>
+          </p:cNvPr>
+          <p:cNvSpPr>
+            <a:spLocks noGrp="1"/>
+          </p:cNvSpPr>
+          <p:nvPr>
+            <p:ph type="ctrTitle"/>
+          </p:nvPr>
+        </p:nvSpPr>
+        <p:spPr/>
+        <p:txBody>
+          <a:bodyPr/>
+          <a:lstStyle/>
+          <a:p>
+            <a:r>
+              <a:rPr lang="en-US" dirty="0"/>
+              <a:t>Title</a:t>
+            </a:r>
+          </a:p>
+        </p:txBody>
+      </p:sp>
+    </p:spTree>
+    <p:extLst>
+      <p:ext uri="{BB962C8B-B14F-4D97-AF65-F5344CB8AC3E}">
+        <p14:creationId xmlns:p14="http://schemas.microsoft.com/office/powerpoint/2010/main" val="2413974456"/>
+      </p:ext>
+    </p:extLst>
+  </p:cSld>
+  <p:clrMapOvr>
+    <a:masterClrMapping/>
+  </p:clrMapOvr>
+</p:sld>
+</file>
+
+<file path=ppt/slides/slide21.xml><?xml version="1.0" encoding="utf-8"?>
+<p:sld xmlns:a="http://schemas.openxmlformats.org/drawingml/2006/main" xmlns:r="http://schemas.openxmlformats.org/officeDocument/2006/relationships" xmlns:p="http://schemas.openxmlformats.org/presentationml/2006/main">
+  <p:cSld>
+    <p:spTree>
+      <p:nvGrpSpPr>
+        <p:cNvPr id="1" name=""/>
+        <p:cNvGrpSpPr/>
+        <p:nvPr/>
+      </p:nvGrpSpPr>
+      <p:grpSpPr>
+        <a:xfrm>
+          <a:off x="0" y="0"/>
+          <a:ext cx="0" cy="0"/>
+          <a:chOff x="0" y="0"/>
+          <a:chExt cx="0" cy="0"/>
+        </a:xfrm>
+      </p:grpSpPr>
+      <p:sp>
+        <p:nvSpPr>
+          <p:cNvPr id="2" name="Title 1">
+            <a:extLst>
+              <a:ext uri="{FF2B5EF4-FFF2-40B4-BE49-F238E27FC236}">
+                <a16:creationId xmlns:a16="http://schemas.microsoft.com/office/drawing/2014/main" id="{7B825C97-D6C6-411B-9807-E2D1BEF1312E}"/>
+              </a:ext>
+            </a:extLst>
+          </p:cNvPr>
+          <p:cNvSpPr>
+            <a:spLocks noGrp="1"/>
+          </p:cNvSpPr>
+          <p:nvPr>
+            <p:ph type="title"/>
+          </p:nvPr>
+        </p:nvSpPr>
+        <p:spPr/>
+        <p:txBody>
+          <a:bodyPr/>
+          <a:lstStyle/>
+          <a:p>
+            <a:r>
+              <a:rPr lang="en-US" dirty="0"/>
+              <a:t>Title</a:t>
+            </a:r>
+          </a:p>
+        </p:txBody>
+      </p:sp>
+      <p:sp>
+        <p:nvSpPr>
+          <p:cNvPr id="3" name="Content Placeholder 2">
+            <a:extLst>
+              <a:ext uri="{FF2B5EF4-FFF2-40B4-BE49-F238E27FC236}">
+                <a16:creationId xmlns:a16="http://schemas.microsoft.com/office/drawing/2014/main" id="{735D6932-4AC1-46A9-906A-91A48F4CF7C3}"/>
+              </a:ext>
+            </a:extLst>
+          </p:cNvPr>
+          <p:cNvSpPr>
+            <a:spLocks noGrp="1"/>
+          </p:cNvSpPr>
+          <p:nvPr>
+            <p:ph idx="1"/>
+          </p:nvPr>
+        </p:nvSpPr>
+        <p:spPr/>
+        <p:txBody>
+          <a:bodyPr/>
+          <a:lstStyle/>
+          <a:p>
+            <a:endParaRPr lang="en-US"/>
+          </a:p>
+        </p:txBody>
+      </p:sp>
+    </p:spTree>
+    <p:extLst>
+      <p:ext uri="{BB962C8B-B14F-4D97-AF65-F5344CB8AC3E}">
+        <p14:creationId xmlns:p14="http://schemas.microsoft.com/office/powerpoint/2010/main" val="1875729406"/>
+      </p:ext>
+    </p:extLst>
+  </p:cSld>
+  <p:clrMapOvr>
+    <a:masterClrMapping/>
+  </p:clrMapOvr>
+</p:sld>
+</file>
+
+<file path=ppt/slides/slide22.xml><?xml version="1.0" encoding="utf-8"?>
+<p:sld xmlns:a="http://schemas.openxmlformats.org/drawingml/2006/main" xmlns:r="http://schemas.openxmlformats.org/officeDocument/2006/relationships" xmlns:p="http://schemas.openxmlformats.org/presentationml/2006/main">
+  <p:cSld>
+    <p:spTree>
+      <p:nvGrpSpPr>
+        <p:cNvPr id="1" name=""/>
+        <p:cNvGrpSpPr/>
+        <p:nvPr/>
+      </p:nvGrpSpPr>
+      <p:grpSpPr>
+        <a:xfrm>
+          <a:off x="0" y="0"/>
+          <a:ext cx="0" cy="0"/>
+          <a:chOff x="0" y="0"/>
+          <a:chExt cx="0" cy="0"/>
+        </a:xfrm>
+      </p:grpSpPr>
+      <p:sp>
+        <p:nvSpPr>
+          <p:cNvPr id="6" name="Title 5">
+            <a:extLst>
+              <a:ext uri="{FF2B5EF4-FFF2-40B4-BE49-F238E27FC236}">
+                <a16:creationId xmlns:a16="http://schemas.microsoft.com/office/drawing/2014/main" id="{D9FFC0E8-97CE-4426-A0C0-75252002ED16}"/>
+              </a:ext>
+            </a:extLst>
+          </p:cNvPr>
+          <p:cNvSpPr>
+            <a:spLocks noGrp="1"/>
+          </p:cNvSpPr>
+          <p:nvPr>
+            <p:ph type="ctrTitle"/>
+          </p:nvPr>
+        </p:nvSpPr>
+        <p:spPr/>
+        <p:txBody>
+          <a:bodyPr/>
+          <a:lstStyle/>
+          <a:p>
+            <a:r>
+              <a:rPr lang="en-US" dirty="0"/>
+              <a:t>Title</a:t>
+            </a:r>
+          </a:p>
+        </p:txBody>
+      </p:sp>
+    </p:spTree>
+    <p:extLst>
+      <p:ext uri="{BB962C8B-B14F-4D97-AF65-F5344CB8AC3E}">
+        <p14:creationId xmlns:p14="http://schemas.microsoft.com/office/powerpoint/2010/main" val="3203675758"/>
+      </p:ext>
+    </p:extLst>
+  </p:cSld>
+  <p:clrMapOvr>
+    <a:masterClrMapping/>
+  </p:clrMapOvr>
+</p:sld>
+</file>
+
+<file path=ppt/slides/slide23.xml><?xml version="1.0" encoding="utf-8"?>
+<p:sld xmlns:a="http://schemas.openxmlformats.org/drawingml/2006/main" xmlns:r="http://schemas.openxmlformats.org/officeDocument/2006/relationships" xmlns:p="http://schemas.openxmlformats.org/presentationml/2006/main">
+  <p:cSld>
+    <p:spTree>
+      <p:nvGrpSpPr>
+        <p:cNvPr id="1" name=""/>
+        <p:cNvGrpSpPr/>
+        <p:nvPr/>
+      </p:nvGrpSpPr>
+      <p:grpSpPr>
+        <a:xfrm>
+          <a:off x="0" y="0"/>
+          <a:ext cx="0" cy="0"/>
+          <a:chOff x="0" y="0"/>
+          <a:chExt cx="0" cy="0"/>
+        </a:xfrm>
+      </p:grpSpPr>
+      <p:sp>
+        <p:nvSpPr>
+          <p:cNvPr id="2" name="Title 1">
+            <a:extLst>
+              <a:ext uri="{FF2B5EF4-FFF2-40B4-BE49-F238E27FC236}">
+                <a16:creationId xmlns:a16="http://schemas.microsoft.com/office/drawing/2014/main" id="{7B825C97-D6C6-411B-9807-E2D1BEF1312E}"/>
+              </a:ext>
+            </a:extLst>
+          </p:cNvPr>
+          <p:cNvSpPr>
+            <a:spLocks noGrp="1"/>
+          </p:cNvSpPr>
+          <p:nvPr>
+            <p:ph type="title"/>
+          </p:nvPr>
+        </p:nvSpPr>
+        <p:spPr/>
+        <p:txBody>
+          <a:bodyPr/>
+          <a:lstStyle/>
+          <a:p>
+            <a:r>
+              <a:rPr lang="en-US" dirty="0"/>
+              <a:t>Title</a:t>
+            </a:r>
+          </a:p>
+        </p:txBody>
+      </p:sp>
+      <p:sp>
+        <p:nvSpPr>
+          <p:cNvPr id="3" name="Content Placeholder 2">
+            <a:extLst>
+              <a:ext uri="{FF2B5EF4-FFF2-40B4-BE49-F238E27FC236}">
+                <a16:creationId xmlns:a16="http://schemas.microsoft.com/office/drawing/2014/main" id="{735D6932-4AC1-46A9-906A-91A48F4CF7C3}"/>
+              </a:ext>
+            </a:extLst>
+          </p:cNvPr>
+          <p:cNvSpPr>
+            <a:spLocks noGrp="1"/>
+          </p:cNvSpPr>
+          <p:nvPr>
+            <p:ph idx="1"/>
+          </p:nvPr>
+        </p:nvSpPr>
+        <p:spPr/>
+        <p:txBody>
+          <a:bodyPr/>
+          <a:lstStyle/>
+          <a:p>
+            <a:endParaRPr lang="en-US"/>
+          </a:p>
+        </p:txBody>
+      </p:sp>
+    </p:spTree>
+    <p:extLst>
+      <p:ext uri="{BB962C8B-B14F-4D97-AF65-F5344CB8AC3E}">
+        <p14:creationId xmlns:p14="http://schemas.microsoft.com/office/powerpoint/2010/main" val="1365667083"/>
+      </p:ext>
+    </p:extLst>
+  </p:cSld>
+  <p:clrMapOvr>
+    <a:masterClrMapping/>
+  </p:clrMapOvr>
+</p:sld>
+</file>
+
+<file path=ppt/slides/slide24.xml><?xml version="1.0" encoding="utf-8"?>
+<p:sld xmlns:a="http://schemas.openxmlformats.org/drawingml/2006/main" xmlns:r="http://schemas.openxmlformats.org/officeDocument/2006/relationships" xmlns:p="http://schemas.openxmlformats.org/presentationml/2006/main">
+  <p:cSld>
+    <p:spTree>
+      <p:nvGrpSpPr>
+        <p:cNvPr id="1" name=""/>
+        <p:cNvGrpSpPr/>
+        <p:nvPr/>
+      </p:nvGrpSpPr>
+      <p:grpSpPr>
+        <a:xfrm>
+          <a:off x="0" y="0"/>
+          <a:ext cx="0" cy="0"/>
+          <a:chOff x="0" y="0"/>
+          <a:chExt cx="0" cy="0"/>
+        </a:xfrm>
+      </p:grpSpPr>
+      <p:sp>
+        <p:nvSpPr>
+          <p:cNvPr id="6" name="Title 5">
+            <a:extLst>
+              <a:ext uri="{FF2B5EF4-FFF2-40B4-BE49-F238E27FC236}">
+                <a16:creationId xmlns:a16="http://schemas.microsoft.com/office/drawing/2014/main" id="{D9FFC0E8-97CE-4426-A0C0-75252002ED16}"/>
+              </a:ext>
+            </a:extLst>
+          </p:cNvPr>
+          <p:cNvSpPr>
+            <a:spLocks noGrp="1"/>
+          </p:cNvSpPr>
+          <p:nvPr>
+            <p:ph type="ctrTitle"/>
+          </p:nvPr>
+        </p:nvSpPr>
+        <p:spPr/>
+        <p:txBody>
+          <a:bodyPr/>
+          <a:lstStyle/>
+          <a:p>
+            <a:r>
+              <a:rPr lang="en-US" dirty="0"/>
+              <a:t>Title</a:t>
+            </a:r>
+          </a:p>
+        </p:txBody>
+      </p:sp>
+    </p:spTree>
+    <p:extLst>
+      <p:ext uri="{BB962C8B-B14F-4D97-AF65-F5344CB8AC3E}">
+        <p14:creationId xmlns:p14="http://schemas.microsoft.com/office/powerpoint/2010/main" val="1705352301"/>
+      </p:ext>
+    </p:extLst>
+  </p:cSld>
+  <p:clrMapOvr>
+    <a:masterClrMapping/>
+  </p:clrMapOvr>
+</p:sld>
+</file>
+
+<file path=ppt/slides/slide25.xml><?xml version="1.0" encoding="utf-8"?>
+<p:sld xmlns:a="http://schemas.openxmlformats.org/drawingml/2006/main" xmlns:r="http://schemas.openxmlformats.org/officeDocument/2006/relationships" xmlns:p="http://schemas.openxmlformats.org/presentationml/2006/main">
+  <p:cSld>
+    <p:spTree>
+      <p:nvGrpSpPr>
+        <p:cNvPr id="1" name=""/>
+        <p:cNvGrpSpPr/>
+        <p:nvPr/>
+      </p:nvGrpSpPr>
+      <p:grpSpPr>
+        <a:xfrm>
+          <a:off x="0" y="0"/>
+          <a:ext cx="0" cy="0"/>
+          <a:chOff x="0" y="0"/>
+          <a:chExt cx="0" cy="0"/>
+        </a:xfrm>
+      </p:grpSpPr>
+      <p:sp>
+        <p:nvSpPr>
+          <p:cNvPr id="2" name="Title 1">
+            <a:extLst>
+              <a:ext uri="{FF2B5EF4-FFF2-40B4-BE49-F238E27FC236}">
+                <a16:creationId xmlns:a16="http://schemas.microsoft.com/office/drawing/2014/main" id="{7B825C97-D6C6-411B-9807-E2D1BEF1312E}"/>
+              </a:ext>
+            </a:extLst>
+          </p:cNvPr>
+          <p:cNvSpPr>
+            <a:spLocks noGrp="1"/>
+          </p:cNvSpPr>
+          <p:nvPr>
+            <p:ph type="title"/>
+          </p:nvPr>
+        </p:nvSpPr>
+        <p:spPr/>
+        <p:txBody>
+          <a:bodyPr/>
+          <a:lstStyle/>
+          <a:p>
+            <a:r>
+              <a:rPr lang="en-US" dirty="0"/>
+              <a:t>Title</a:t>
+            </a:r>
+          </a:p>
+        </p:txBody>
+      </p:sp>
+      <p:sp>
+        <p:nvSpPr>
+          <p:cNvPr id="3" name="Content Placeholder 2">
+            <a:extLst>
+              <a:ext uri="{FF2B5EF4-FFF2-40B4-BE49-F238E27FC236}">
+                <a16:creationId xmlns:a16="http://schemas.microsoft.com/office/drawing/2014/main" id="{735D6932-4AC1-46A9-906A-91A48F4CF7C3}"/>
+              </a:ext>
+            </a:extLst>
+          </p:cNvPr>
+          <p:cNvSpPr>
+            <a:spLocks noGrp="1"/>
+          </p:cNvSpPr>
+          <p:nvPr>
+            <p:ph idx="1"/>
+          </p:nvPr>
+        </p:nvSpPr>
+        <p:spPr/>
+        <p:txBody>
+          <a:bodyPr/>
+          <a:lstStyle/>
+          <a:p>
+            <a:endParaRPr lang="en-US"/>
+          </a:p>
+        </p:txBody>
+      </p:sp>
+    </p:spTree>
+    <p:extLst>
+      <p:ext uri="{BB962C8B-B14F-4D97-AF65-F5344CB8AC3E}">
+        <p14:creationId xmlns:p14="http://schemas.microsoft.com/office/powerpoint/2010/main" val="2497581501"/>
+      </p:ext>
+    </p:extLst>
+  </p:cSld>
+  <p:clrMapOvr>
+    <a:masterClrMapping/>
+  </p:clrMapOvr>
+</p:sld>
+</file>
+
 <file path=ppt/slides/slide3.xml><?xml version="1.0" encoding="utf-8"?>
 <p:sld xmlns:a="http://schemas.openxmlformats.org/drawingml/2006/main" xmlns:r="http://schemas.openxmlformats.org/officeDocument/2006/relationships" xmlns:p="http://schemas.openxmlformats.org/presentationml/2006/main">
   <p:cSld>
@@ -15810,9 +16704,29 @@
           <a:lstStyle/>
           <a:p>
             <a:r>
-              <a:rPr lang="en-US" dirty="0" err="1"/>
-              <a:t>sadf</a:t>
-            </a:r>
+              <a:rPr lang="en-US" dirty="0"/>
+              <a:t>Introduction</a:t>
+            </a:r>
+          </a:p>
+          <a:p>
+            <a:r>
+              <a:rPr lang="en-US" dirty="0"/>
+              <a:t>General comparisons</a:t>
+            </a:r>
+          </a:p>
+          <a:p>
+            <a:r>
+              <a:rPr lang="en-US" dirty="0"/>
+              <a:t>Storage</a:t>
+            </a:r>
+          </a:p>
+          <a:p>
+            <a:r>
+              <a:rPr lang="en-US" dirty="0"/>
+              <a:t>Compute</a:t>
+            </a:r>
+          </a:p>
+          <a:p>
             <a:endParaRPr lang="en-US" dirty="0"/>
           </a:p>
           <a:p>
@@ -15870,6 +16784,153 @@
                                           <p:spTgt spid="3">
                                             <p:txEl>
                                               <p:pRg st="0" end="0"/>
+                                            </p:txEl>
+                                          </p:spTgt>
+                                        </p:tgtEl>
+                                        <p:attrNameLst>
+                                          <p:attrName>style.visibility</p:attrName>
+                                        </p:attrNameLst>
+                                      </p:cBhvr>
+                                      <p:to>
+                                        <p:strVal val="visible"/>
+                                      </p:to>
+                                    </p:set>
+                                  </p:childTnLst>
+                                </p:cTn>
+                              </p:par>
+                            </p:childTnLst>
+                          </p:cTn>
+                        </p:par>
+                      </p:childTnLst>
+                    </p:cTn>
+                  </p:par>
+                  <p:par>
+                    <p:cTn id="7" fill="hold">
+                      <p:stCondLst>
+                        <p:cond delay="indefinite"/>
+                      </p:stCondLst>
+                      <p:childTnLst>
+                        <p:par>
+                          <p:cTn id="8" fill="hold">
+                            <p:stCondLst>
+                              <p:cond delay="0"/>
+                            </p:stCondLst>
+                            <p:childTnLst>
+                              <p:par>
+                                <p:cTn id="9" presetID="1" presetClass="entr" presetSubtype="0" fill="hold" nodeType="clickEffect">
+                                  <p:stCondLst>
+                                    <p:cond delay="0"/>
+                                  </p:stCondLst>
+                                  <p:childTnLst>
+                                    <p:set>
+                                      <p:cBhvr>
+                                        <p:cTn id="10" dur="1" fill="hold">
+                                          <p:stCondLst>
+                                            <p:cond delay="0"/>
+                                          </p:stCondLst>
+                                        </p:cTn>
+                                        <p:tgtEl>
+                                          <p:spTgt spid="3">
+                                            <p:txEl>
+                                              <p:pRg st="1" end="1"/>
+                                            </p:txEl>
+                                          </p:spTgt>
+                                        </p:tgtEl>
+                                        <p:attrNameLst>
+                                          <p:attrName>style.visibility</p:attrName>
+                                        </p:attrNameLst>
+                                      </p:cBhvr>
+                                      <p:to>
+                                        <p:strVal val="visible"/>
+                                      </p:to>
+                                    </p:set>
+                                  </p:childTnLst>
+                                </p:cTn>
+                              </p:par>
+                            </p:childTnLst>
+                          </p:cTn>
+                        </p:par>
+                      </p:childTnLst>
+                    </p:cTn>
+                  </p:par>
+                  <p:par>
+                    <p:cTn id="11" fill="hold">
+                      <p:stCondLst>
+                        <p:cond delay="indefinite"/>
+                      </p:stCondLst>
+                      <p:childTnLst>
+                        <p:par>
+                          <p:cTn id="12" fill="hold">
+                            <p:stCondLst>
+                              <p:cond delay="0"/>
+                            </p:stCondLst>
+                            <p:childTnLst>
+                              <p:par>
+                                <p:cTn id="13" presetID="1" presetClass="entr" presetSubtype="0" fill="hold" nodeType="clickEffect">
+                                  <p:stCondLst>
+                                    <p:cond delay="0"/>
+                                  </p:stCondLst>
+                                  <p:childTnLst>
+                                    <p:set>
+                                      <p:cBhvr>
+                                        <p:cTn id="14" dur="1" fill="hold">
+                                          <p:stCondLst>
+                                            <p:cond delay="0"/>
+                                          </p:stCondLst>
+                                        </p:cTn>
+                                        <p:tgtEl>
+                                          <p:spTgt spid="3">
+                                            <p:txEl>
+                                              <p:pRg st="2" end="2"/>
+                                            </p:txEl>
+                                          </p:spTgt>
+                                        </p:tgtEl>
+                                        <p:attrNameLst>
+                                          <p:attrName>style.visibility</p:attrName>
+                                        </p:attrNameLst>
+                                      </p:cBhvr>
+                                      <p:to>
+                                        <p:strVal val="visible"/>
+                                      </p:to>
+                                    </p:set>
+                                  </p:childTnLst>
+                                </p:cTn>
+                              </p:par>
+                            </p:childTnLst>
+                          </p:cTn>
+                        </p:par>
+                      </p:childTnLst>
+                    </p:cTn>
+                  </p:par>
+                  <p:par>
+                    <p:cTn id="15" fill="hold">
+                      <p:stCondLst>
+                        <p:cond delay="indefinite"/>
+                      </p:stCondLst>
+                      <p:childTnLst>
+                        <p:par>
+                          <p:cTn id="16" fill="hold">
+                            <p:stCondLst>
+                              <p:cond delay="0"/>
+                            </p:stCondLst>
+                            <p:childTnLst>
+                              <p:par>
+                                <p:cTn id="17" presetID="1" presetClass="entr" presetSubtype="0" fill="hold" nodeType="clickEffect">
+                                  <p:stCondLst>
+                                    <p:cond delay="0"/>
+                                  </p:stCondLst>
+                                  <p:childTnLst>
+                                    <p:set>
+                                      <p:cBhvr>
+                                        <p:cTn id="18" dur="1" fill="hold">
+                                          <p:stCondLst>
+                                            <p:cond delay="0"/>
+                                          </p:stCondLst>
+                                        </p:cTn>
+                                        <p:tgtEl>
+                                          <p:spTgt spid="3">
+                                            <p:txEl>
+                                              <p:pRg st="3" end="3"/>
                                             </p:txEl>
                                           </p:spTgt>
                                         </p:tgtEl>
@@ -15982,10 +17043,27 @@
           <a:lstStyle/>
           <a:p>
             <a:r>
-              <a:rPr lang="en-US" dirty="0" err="1"/>
-              <a:t>asdf</a:t>
-            </a:r>
-            <a:endParaRPr lang="en-US" dirty="0"/>
+              <a:rPr lang="en-US" dirty="0"/>
+              <a:t>Networking </a:t>
+            </a:r>
+          </a:p>
+          <a:p>
+            <a:r>
+              <a:rPr lang="en-US" dirty="0"/>
+              <a:t>Security</a:t>
+            </a:r>
+          </a:p>
+          <a:p>
+            <a:r>
+              <a:rPr lang="en-US" dirty="0"/>
+              <a:t>Monitoring</a:t>
+            </a:r>
+          </a:p>
+          <a:p>
+            <a:r>
+              <a:rPr lang="en-US" dirty="0"/>
+              <a:t>Pricing</a:t>
+            </a:r>
           </a:p>
           <a:p>
             <a:endParaRPr lang="en-US" dirty="0"/>
@@ -16039,6 +17117,153 @@
                                           <p:spTgt spid="3">
                                             <p:txEl>
                                               <p:pRg st="0" end="0"/>
+                                            </p:txEl>
+                                          </p:spTgt>
+                                        </p:tgtEl>
+                                        <p:attrNameLst>
+                                          <p:attrName>style.visibility</p:attrName>
+                                        </p:attrNameLst>
+                                      </p:cBhvr>
+                                      <p:to>
+                                        <p:strVal val="visible"/>
+                                      </p:to>
+                                    </p:set>
+                                  </p:childTnLst>
+                                </p:cTn>
+                              </p:par>
+                            </p:childTnLst>
+                          </p:cTn>
+                        </p:par>
+                      </p:childTnLst>
+                    </p:cTn>
+                  </p:par>
+                  <p:par>
+                    <p:cTn id="7" fill="hold">
+                      <p:stCondLst>
+                        <p:cond delay="indefinite"/>
+                      </p:stCondLst>
+                      <p:childTnLst>
+                        <p:par>
+                          <p:cTn id="8" fill="hold">
+                            <p:stCondLst>
+                              <p:cond delay="0"/>
+                            </p:stCondLst>
+                            <p:childTnLst>
+                              <p:par>
+                                <p:cTn id="9" presetID="1" presetClass="entr" presetSubtype="0" fill="hold" nodeType="clickEffect">
+                                  <p:stCondLst>
+                                    <p:cond delay="0"/>
+                                  </p:stCondLst>
+                                  <p:childTnLst>
+                                    <p:set>
+                                      <p:cBhvr>
+                                        <p:cTn id="10" dur="1" fill="hold">
+                                          <p:stCondLst>
+                                            <p:cond delay="0"/>
+                                          </p:stCondLst>
+                                        </p:cTn>
+                                        <p:tgtEl>
+                                          <p:spTgt spid="3">
+                                            <p:txEl>
+                                              <p:pRg st="1" end="1"/>
+                                            </p:txEl>
+                                          </p:spTgt>
+                                        </p:tgtEl>
+                                        <p:attrNameLst>
+                                          <p:attrName>style.visibility</p:attrName>
+                                        </p:attrNameLst>
+                                      </p:cBhvr>
+                                      <p:to>
+                                        <p:strVal val="visible"/>
+                                      </p:to>
+                                    </p:set>
+                                  </p:childTnLst>
+                                </p:cTn>
+                              </p:par>
+                            </p:childTnLst>
+                          </p:cTn>
+                        </p:par>
+                      </p:childTnLst>
+                    </p:cTn>
+                  </p:par>
+                  <p:par>
+                    <p:cTn id="11" fill="hold">
+                      <p:stCondLst>
+                        <p:cond delay="indefinite"/>
+                      </p:stCondLst>
+                      <p:childTnLst>
+                        <p:par>
+                          <p:cTn id="12" fill="hold">
+                            <p:stCondLst>
+                              <p:cond delay="0"/>
+                            </p:stCondLst>
+                            <p:childTnLst>
+                              <p:par>
+                                <p:cTn id="13" presetID="1" presetClass="entr" presetSubtype="0" fill="hold" nodeType="clickEffect">
+                                  <p:stCondLst>
+                                    <p:cond delay="0"/>
+                                  </p:stCondLst>
+                                  <p:childTnLst>
+                                    <p:set>
+                                      <p:cBhvr>
+                                        <p:cTn id="14" dur="1" fill="hold">
+                                          <p:stCondLst>
+                                            <p:cond delay="0"/>
+                                          </p:stCondLst>
+                                        </p:cTn>
+                                        <p:tgtEl>
+                                          <p:spTgt spid="3">
+                                            <p:txEl>
+                                              <p:pRg st="2" end="2"/>
+                                            </p:txEl>
+                                          </p:spTgt>
+                                        </p:tgtEl>
+                                        <p:attrNameLst>
+                                          <p:attrName>style.visibility</p:attrName>
+                                        </p:attrNameLst>
+                                      </p:cBhvr>
+                                      <p:to>
+                                        <p:strVal val="visible"/>
+                                      </p:to>
+                                    </p:set>
+                                  </p:childTnLst>
+                                </p:cTn>
+                              </p:par>
+                            </p:childTnLst>
+                          </p:cTn>
+                        </p:par>
+                      </p:childTnLst>
+                    </p:cTn>
+                  </p:par>
+                  <p:par>
+                    <p:cTn id="15" fill="hold">
+                      <p:stCondLst>
+                        <p:cond delay="indefinite"/>
+                      </p:stCondLst>
+                      <p:childTnLst>
+                        <p:par>
+                          <p:cTn id="16" fill="hold">
+                            <p:stCondLst>
+                              <p:cond delay="0"/>
+                            </p:stCondLst>
+                            <p:childTnLst>
+                              <p:par>
+                                <p:cTn id="17" presetID="1" presetClass="entr" presetSubtype="0" fill="hold" nodeType="clickEffect">
+                                  <p:stCondLst>
+                                    <p:cond delay="0"/>
+                                  </p:stCondLst>
+                                  <p:childTnLst>
+                                    <p:set>
+                                      <p:cBhvr>
+                                        <p:cTn id="18" dur="1" fill="hold">
+                                          <p:stCondLst>
+                                            <p:cond delay="0"/>
+                                          </p:stCondLst>
+                                        </p:cTn>
+                                        <p:tgtEl>
+                                          <p:spTgt spid="3">
+                                            <p:txEl>
+                                              <p:pRg st="3" end="3"/>
                                             </p:txEl>
                                           </p:spTgt>
                                         </p:tgtEl>

</xml_diff>